<commit_message>
update Clase9 y .gitignore
</commit_message>
<xml_diff>
--- a/Clase 9/Actividad integradora armado de computadoras.pptx
+++ b/Clase 9/Actividad integradora armado de computadoras.pptx
@@ -2015,7 +2015,7 @@
         </p:nvSpPr>
         <p:spPr>
           <a:xfrm>
-            <a:off x="381300" y="685800"/>
+            <a:off x="381000" y="685800"/>
             <a:ext cx="6096000" cy="3429000"/>
           </a:xfrm>
           <a:custGeom>
@@ -14434,7 +14434,7 @@
           <p:nvPr>
             <p:extLst>
               <p:ext uri="{D42A27DB-BD31-4B8C-83A1-F6EECF244321}">
-                <p14:modId xmlns:p14="http://schemas.microsoft.com/office/powerpoint/2010/main" val="1132128031"/>
+                <p14:modId xmlns:p14="http://schemas.microsoft.com/office/powerpoint/2010/main" val="1438377075"/>
               </p:ext>
             </p:extLst>
           </p:nvPr>
@@ -14899,16 +14899,64 @@
                     <a:bodyPr/>
                     <a:lstStyle/>
                     <a:p>
-                      <a:pPr marL="0" lvl="0" indent="0" algn="l" rtl="0">
+                      <a:pPr marL="0" marR="0" lvl="0" indent="0" algn="l" defTabSz="914400" rtl="0" eaLnBrk="1" fontAlgn="auto" latinLnBrk="0" hangingPunct="1">
+                        <a:lnSpc>
+                          <a:spcPct val="100000"/>
+                        </a:lnSpc>
                         <a:spcBef>
                           <a:spcPts val="0"/>
                         </a:spcBef>
                         <a:spcAft>
                           <a:spcPts val="0"/>
                         </a:spcAft>
+                        <a:buClr>
+                          <a:srgbClr val="000000"/>
+                        </a:buClr>
+                        <a:buSzTx/>
+                        <a:buFont typeface="Arial"/>
                         <a:buNone/>
+                        <a:tabLst/>
+                        <a:defRPr/>
                       </a:pPr>
-                      <a:endParaRPr dirty="0"/>
+                      <a:r>
+                        <a:rPr lang="es-AR" sz="1400" b="1" i="0" u="none" strike="noStrike" cap="none" dirty="0">
+                          <a:solidFill>
+                            <a:srgbClr val="000000"/>
+                          </a:solidFill>
+                          <a:effectLst/>
+                          <a:latin typeface="Arial"/>
+                          <a:ea typeface="Arial"/>
+                          <a:cs typeface="Arial"/>
+                          <a:sym typeface="Arial"/>
+                        </a:rPr>
+                        <a:t>MSI GeForce GTX 1650 4GB GDDR6 </a:t>
+                      </a:r>
+                      <a:r>
+                        <a:rPr lang="es-AR" sz="1400" b="1" i="0" u="none" strike="noStrike" cap="none" dirty="0" err="1">
+                          <a:solidFill>
+                            <a:srgbClr val="000000"/>
+                          </a:solidFill>
+                          <a:effectLst/>
+                          <a:latin typeface="Arial"/>
+                          <a:ea typeface="Arial"/>
+                          <a:cs typeface="Arial"/>
+                          <a:sym typeface="Arial"/>
+                        </a:rPr>
+                        <a:t>Ventus</a:t>
+                      </a:r>
+                      <a:r>
+                        <a:rPr lang="es-AR" sz="1400" b="1" i="0" u="none" strike="noStrike" cap="none" dirty="0">
+                          <a:solidFill>
+                            <a:srgbClr val="000000"/>
+                          </a:solidFill>
+                          <a:effectLst/>
+                          <a:latin typeface="Arial"/>
+                          <a:ea typeface="Arial"/>
+                          <a:cs typeface="Arial"/>
+                          <a:sym typeface="Arial"/>
+                        </a:rPr>
+                        <a:t> XS OC</a:t>
+                      </a:r>
                     </a:p>
                   </a:txBody>
                   <a:tcPr marL="91425" marR="91425" marT="91425" marB="91425">
@@ -16025,11 +16073,17 @@
         <p:nvGraphicFramePr>
           <p:cNvPr id="228" name="Google Shape;228;p47"/>
           <p:cNvGraphicFramePr/>
-          <p:nvPr/>
+          <p:nvPr>
+            <p:extLst>
+              <p:ext uri="{D42A27DB-BD31-4B8C-83A1-F6EECF244321}">
+                <p14:modId xmlns:p14="http://schemas.microsoft.com/office/powerpoint/2010/main" val="1360153867"/>
+              </p:ext>
+            </p:extLst>
+          </p:nvPr>
         </p:nvGraphicFramePr>
         <p:xfrm>
           <a:off x="952500" y="1809750"/>
-          <a:ext cx="7239000" cy="1981050"/>
+          <a:ext cx="7239000" cy="2194410"/>
         </p:xfrm>
         <a:graphic>
           <a:graphicData uri="http://schemas.openxmlformats.org/drawingml/2006/table">
@@ -16107,7 +16161,7 @@
                         <a:buNone/>
                       </a:pPr>
                       <a:r>
-                        <a:rPr lang="es">
+                        <a:rPr lang="es" dirty="0">
                           <a:latin typeface="Open Sans"/>
                           <a:ea typeface="Open Sans"/>
                           <a:cs typeface="Open Sans"/>
@@ -16115,7 +16169,7 @@
                         </a:rPr>
                         <a:t>Amd Ryzen 7 3800xt</a:t>
                       </a:r>
-                      <a:endParaRPr>
+                      <a:endParaRPr dirty="0">
                         <a:latin typeface="Open Sans"/>
                         <a:ea typeface="Open Sans"/>
                         <a:cs typeface="Open Sans"/>
@@ -16178,16 +16232,64 @@
                     <a:bodyPr/>
                     <a:lstStyle/>
                     <a:p>
-                      <a:pPr marL="0" lvl="0" indent="0" algn="l" rtl="0">
+                      <a:pPr marL="0" marR="0" lvl="0" indent="0" algn="l" defTabSz="914400" rtl="0" eaLnBrk="1" fontAlgn="auto" latinLnBrk="0" hangingPunct="1">
+                        <a:lnSpc>
+                          <a:spcPct val="100000"/>
+                        </a:lnSpc>
                         <a:spcBef>
                           <a:spcPts val="0"/>
                         </a:spcBef>
                         <a:spcAft>
                           <a:spcPts val="0"/>
                         </a:spcAft>
+                        <a:buClr>
+                          <a:srgbClr val="000000"/>
+                        </a:buClr>
+                        <a:buSzTx/>
+                        <a:buFont typeface="Arial"/>
                         <a:buNone/>
+                        <a:tabLst/>
+                        <a:defRPr/>
                       </a:pPr>
-                      <a:endParaRPr/>
+                      <a:r>
+                        <a:rPr lang="es-AR" sz="1400" b="1" i="0" u="none" strike="noStrike" cap="none" dirty="0">
+                          <a:solidFill>
+                            <a:srgbClr val="000000"/>
+                          </a:solidFill>
+                          <a:effectLst/>
+                          <a:latin typeface="Arial"/>
+                          <a:ea typeface="Arial"/>
+                          <a:cs typeface="Arial"/>
+                          <a:sym typeface="Arial"/>
+                        </a:rPr>
+                        <a:t>ASUS ROG STRIX B550-E </a:t>
+                      </a:r>
+                      <a:r>
+                        <a:rPr lang="es-AR" sz="1400" b="1" i="0" u="none" strike="noStrike" cap="none" dirty="0" err="1">
+                          <a:solidFill>
+                            <a:srgbClr val="000000"/>
+                          </a:solidFill>
+                          <a:effectLst/>
+                          <a:latin typeface="Arial"/>
+                          <a:ea typeface="Arial"/>
+                          <a:cs typeface="Arial"/>
+                          <a:sym typeface="Arial"/>
+                        </a:rPr>
+                        <a:t>Gaming</a:t>
+                      </a:r>
+                      <a:r>
+                        <a:rPr lang="es-AR" sz="1400" b="1" i="0" u="none" strike="noStrike" cap="none" dirty="0">
+                          <a:solidFill>
+                            <a:srgbClr val="000000"/>
+                          </a:solidFill>
+                          <a:effectLst/>
+                          <a:latin typeface="Arial"/>
+                          <a:ea typeface="Arial"/>
+                          <a:cs typeface="Arial"/>
+                          <a:sym typeface="Arial"/>
+                        </a:rPr>
+                        <a:t> AM4</a:t>
+                      </a:r>
                     </a:p>
                   </a:txBody>
                   <a:tcPr marL="91425" marR="91425" marT="91425" marB="91425">
@@ -16245,16 +16347,38 @@
                     <a:bodyPr/>
                     <a:lstStyle/>
                     <a:p>
-                      <a:pPr marL="0" lvl="0" indent="0" algn="l" rtl="0">
+                      <a:pPr marL="0" marR="0" lvl="0" indent="0" algn="l" defTabSz="914400" rtl="0" eaLnBrk="1" fontAlgn="auto" latinLnBrk="0" hangingPunct="1">
+                        <a:lnSpc>
+                          <a:spcPct val="100000"/>
+                        </a:lnSpc>
                         <a:spcBef>
                           <a:spcPts val="0"/>
                         </a:spcBef>
                         <a:spcAft>
                           <a:spcPts val="0"/>
                         </a:spcAft>
+                        <a:buClr>
+                          <a:srgbClr val="000000"/>
+                        </a:buClr>
+                        <a:buSzTx/>
+                        <a:buFont typeface="Arial"/>
                         <a:buNone/>
+                        <a:tabLst/>
+                        <a:defRPr/>
                       </a:pPr>
-                      <a:endParaRPr/>
+                      <a:r>
+                        <a:rPr lang="es-AR" sz="1400" b="1" i="0" u="none" strike="noStrike" cap="none" dirty="0">
+                          <a:solidFill>
+                            <a:srgbClr val="000000"/>
+                          </a:solidFill>
+                          <a:effectLst/>
+                          <a:latin typeface="Arial"/>
+                          <a:ea typeface="Arial"/>
+                          <a:cs typeface="Arial"/>
+                          <a:sym typeface="Arial"/>
+                        </a:rPr>
+                        <a:t>Gigabyte DDR4 16GB (2x8GB) 3600MHz AORUS RGB Silver</a:t>
+                      </a:r>
                     </a:p>
                   </a:txBody>
                   <a:tcPr marL="91425" marR="91425" marT="91425" marB="91425">
@@ -16312,16 +16436,64 @@
                     <a:bodyPr/>
                     <a:lstStyle/>
                     <a:p>
-                      <a:pPr marL="0" lvl="0" indent="0" algn="l" rtl="0">
+                      <a:pPr marL="0" marR="0" lvl="0" indent="0" algn="l" defTabSz="914400" rtl="0" eaLnBrk="1" fontAlgn="auto" latinLnBrk="0" hangingPunct="1">
+                        <a:lnSpc>
+                          <a:spcPct val="100000"/>
+                        </a:lnSpc>
                         <a:spcBef>
                           <a:spcPts val="0"/>
                         </a:spcBef>
                         <a:spcAft>
                           <a:spcPts val="0"/>
                         </a:spcAft>
+                        <a:buClr>
+                          <a:srgbClr val="000000"/>
+                        </a:buClr>
+                        <a:buSzTx/>
+                        <a:buFont typeface="Arial"/>
                         <a:buNone/>
+                        <a:tabLst/>
+                        <a:defRPr/>
                       </a:pPr>
-                      <a:endParaRPr/>
+                      <a:r>
+                        <a:rPr lang="en-US" sz="1400" b="1" i="0" u="none" strike="noStrike" cap="none" dirty="0">
+                          <a:solidFill>
+                            <a:srgbClr val="000000"/>
+                          </a:solidFill>
+                          <a:effectLst/>
+                          <a:latin typeface="Arial"/>
+                          <a:ea typeface="Arial"/>
+                          <a:cs typeface="Arial"/>
+                          <a:sym typeface="Arial"/>
+                        </a:rPr>
+                        <a:t>SSD M.2 WD 1TB Black SN850 7000MB/s </a:t>
+                      </a:r>
+                      <a:r>
+                        <a:rPr lang="en-US" sz="1400" b="1" i="0" u="none" strike="noStrike" cap="none" dirty="0" err="1">
+                          <a:solidFill>
+                            <a:srgbClr val="000000"/>
+                          </a:solidFill>
+                          <a:effectLst/>
+                          <a:latin typeface="Arial"/>
+                          <a:ea typeface="Arial"/>
+                          <a:cs typeface="Arial"/>
+                          <a:sym typeface="Arial"/>
+                        </a:rPr>
+                        <a:t>NVMe</a:t>
+                      </a:r>
+                      <a:r>
+                        <a:rPr lang="en-US" sz="1400" b="1" i="0" u="none" strike="noStrike" cap="none" dirty="0">
+                          <a:solidFill>
+                            <a:srgbClr val="000000"/>
+                          </a:solidFill>
+                          <a:effectLst/>
+                          <a:latin typeface="Arial"/>
+                          <a:ea typeface="Arial"/>
+                          <a:cs typeface="Arial"/>
+                          <a:sym typeface="Arial"/>
+                        </a:rPr>
+                        <a:t> PCI Gen4 Con Heatsink</a:t>
+                      </a:r>
                     </a:p>
                   </a:txBody>
                   <a:tcPr marL="91425" marR="91425" marT="91425" marB="91425">
@@ -16379,16 +16551,38 @@
                     <a:bodyPr/>
                     <a:lstStyle/>
                     <a:p>
-                      <a:pPr marL="0" lvl="0" indent="0" algn="l" rtl="0">
+                      <a:pPr marL="0" marR="0" lvl="0" indent="0" algn="l" defTabSz="914400" rtl="0" eaLnBrk="1" fontAlgn="auto" latinLnBrk="0" hangingPunct="1">
+                        <a:lnSpc>
+                          <a:spcPct val="100000"/>
+                        </a:lnSpc>
                         <a:spcBef>
                           <a:spcPts val="0"/>
                         </a:spcBef>
                         <a:spcAft>
                           <a:spcPts val="0"/>
                         </a:spcAft>
+                        <a:buClr>
+                          <a:srgbClr val="000000"/>
+                        </a:buClr>
+                        <a:buSzTx/>
+                        <a:buFont typeface="Arial"/>
                         <a:buNone/>
+                        <a:tabLst/>
+                        <a:defRPr/>
                       </a:pPr>
-                      <a:endParaRPr/>
+                      <a:r>
+                        <a:rPr lang="es-AR" sz="1400" b="1" i="0" u="none" strike="noStrike" cap="none" dirty="0">
+                          <a:solidFill>
+                            <a:srgbClr val="000000"/>
+                          </a:solidFill>
+                          <a:effectLst/>
+                          <a:latin typeface="Arial"/>
+                          <a:ea typeface="Arial"/>
+                          <a:cs typeface="Arial"/>
+                          <a:sym typeface="Arial"/>
+                        </a:rPr>
+                        <a:t>PNY GeForce RTX 3080 10GB GDDR6X XLR8 EPIC-X RGB </a:t>
+                      </a:r>
                     </a:p>
                   </a:txBody>
                   <a:tcPr marL="91425" marR="91425" marT="91425" marB="91425">
@@ -16575,20 +16769,7 @@
                 <a:sym typeface="Open Sans"/>
                 <a:hlinkClick r:id="rId4" action="ppaction://hlinksldjump"/>
               </a:rPr>
-              <a:t>Especificaciones</a:t>
-            </a:r>
-            <a:r>
-              <a:rPr lang="es" sz="2000" b="1" u="sng">
-                <a:solidFill>
-                  <a:schemeClr val="hlink"/>
-                </a:solidFill>
-                <a:latin typeface="Open Sans"/>
-                <a:ea typeface="Open Sans"/>
-                <a:cs typeface="Open Sans"/>
-                <a:sym typeface="Open Sans"/>
-                <a:hlinkClick r:id="rId4" action="ppaction://hlinksldjump"/>
-              </a:rPr>
-              <a:t> de equipos</a:t>
+              <a:t>Especificaciones de equipos</a:t>
             </a:r>
             <a:endParaRPr sz="2000" b="1">
               <a:solidFill>
@@ -16930,11 +17111,17 @@
         <p:nvGraphicFramePr>
           <p:cNvPr id="236" name="Google Shape;236;p48"/>
           <p:cNvGraphicFramePr/>
-          <p:nvPr/>
+          <p:nvPr>
+            <p:extLst>
+              <p:ext uri="{D42A27DB-BD31-4B8C-83A1-F6EECF244321}">
+                <p14:modId xmlns:p14="http://schemas.microsoft.com/office/powerpoint/2010/main" val="1855940258"/>
+              </p:ext>
+            </p:extLst>
+          </p:nvPr>
         </p:nvGraphicFramePr>
         <p:xfrm>
           <a:off x="952500" y="2114550"/>
-          <a:ext cx="3000000" cy="3000000"/>
+          <a:ext cx="7239000" cy="2407770"/>
         </p:xfrm>
         <a:graphic>
           <a:graphicData uri="http://schemas.openxmlformats.org/drawingml/2006/table">
@@ -17002,21 +17189,38 @@
                     <a:bodyPr/>
                     <a:lstStyle/>
                     <a:p>
-                      <a:pPr marL="0" lvl="0" indent="0" algn="l" rtl="0">
+                      <a:pPr marL="0" marR="0" lvl="0" indent="0" algn="l" defTabSz="914400" rtl="0" eaLnBrk="1" fontAlgn="auto" latinLnBrk="0" hangingPunct="1">
+                        <a:lnSpc>
+                          <a:spcPct val="100000"/>
+                        </a:lnSpc>
                         <a:spcBef>
                           <a:spcPts val="0"/>
                         </a:spcBef>
                         <a:spcAft>
                           <a:spcPts val="0"/>
                         </a:spcAft>
+                        <a:buClr>
+                          <a:srgbClr val="000000"/>
+                        </a:buClr>
+                        <a:buSzTx/>
+                        <a:buFont typeface="Arial"/>
                         <a:buNone/>
+                        <a:tabLst/>
+                        <a:defRPr/>
                       </a:pPr>
-                      <a:endParaRPr>
-                        <a:latin typeface="Open Sans"/>
-                        <a:ea typeface="Open Sans"/>
-                        <a:cs typeface="Open Sans"/>
-                        <a:sym typeface="Open Sans"/>
-                      </a:endParaRPr>
+                      <a:r>
+                        <a:rPr lang="it-IT" sz="1400" b="1" i="0" u="none" strike="noStrike" cap="none" dirty="0">
+                          <a:solidFill>
+                            <a:srgbClr val="000000"/>
+                          </a:solidFill>
+                          <a:effectLst/>
+                          <a:latin typeface="Arial"/>
+                          <a:ea typeface="Arial"/>
+                          <a:cs typeface="Arial"/>
+                          <a:sym typeface="Arial"/>
+                        </a:rPr>
+                        <a:t>Intel Core i9 10900K 5.3GHz Turbo 1200 Comet Lake</a:t>
+                      </a:r>
                     </a:p>
                   </a:txBody>
                   <a:tcPr marL="91425" marR="91425" marT="91425" marB="91425">
@@ -17074,21 +17278,64 @@
                     <a:bodyPr/>
                     <a:lstStyle/>
                     <a:p>
-                      <a:pPr marL="0" lvl="0" indent="0" algn="l" rtl="0">
+                      <a:pPr marL="0" marR="0" lvl="0" indent="0" algn="l" defTabSz="914400" rtl="0" eaLnBrk="1" fontAlgn="auto" latinLnBrk="0" hangingPunct="1">
+                        <a:lnSpc>
+                          <a:spcPct val="100000"/>
+                        </a:lnSpc>
                         <a:spcBef>
                           <a:spcPts val="0"/>
                         </a:spcBef>
                         <a:spcAft>
                           <a:spcPts val="0"/>
                         </a:spcAft>
+                        <a:buClr>
+                          <a:srgbClr val="000000"/>
+                        </a:buClr>
+                        <a:buSzTx/>
+                        <a:buFont typeface="Arial"/>
                         <a:buNone/>
+                        <a:tabLst/>
+                        <a:defRPr/>
                       </a:pPr>
-                      <a:endParaRPr>
-                        <a:latin typeface="Open Sans"/>
-                        <a:ea typeface="Open Sans"/>
-                        <a:cs typeface="Open Sans"/>
-                        <a:sym typeface="Open Sans"/>
-                      </a:endParaRPr>
+                      <a:r>
+                        <a:rPr lang="en-US" sz="1400" b="1" i="0" u="none" strike="noStrike" cap="none" dirty="0">
+                          <a:solidFill>
+                            <a:srgbClr val="000000"/>
+                          </a:solidFill>
+                          <a:effectLst/>
+                          <a:latin typeface="Arial"/>
+                          <a:ea typeface="Arial"/>
+                          <a:cs typeface="Arial"/>
+                          <a:sym typeface="Arial"/>
+                        </a:rPr>
+                        <a:t>Gigabyte Z490 </a:t>
+                      </a:r>
+                      <a:r>
+                        <a:rPr lang="en-US" sz="1400" b="1" i="0" u="none" strike="noStrike" cap="none" dirty="0" err="1">
+                          <a:solidFill>
+                            <a:srgbClr val="000000"/>
+                          </a:solidFill>
+                          <a:effectLst/>
+                          <a:latin typeface="Arial"/>
+                          <a:ea typeface="Arial"/>
+                          <a:cs typeface="Arial"/>
+                          <a:sym typeface="Arial"/>
+                        </a:rPr>
+                        <a:t>Aorus</a:t>
+                      </a:r>
+                      <a:r>
+                        <a:rPr lang="en-US" sz="1400" b="1" i="0" u="none" strike="noStrike" cap="none" dirty="0">
+                          <a:solidFill>
+                            <a:srgbClr val="000000"/>
+                          </a:solidFill>
+                          <a:effectLst/>
+                          <a:latin typeface="Arial"/>
+                          <a:ea typeface="Arial"/>
+                          <a:cs typeface="Arial"/>
+                          <a:sym typeface="Arial"/>
+                        </a:rPr>
+                        <a:t> Xtreme Socket 1200 10th Gen</a:t>
+                      </a:r>
                     </a:p>
                   </a:txBody>
                   <a:tcPr marL="91425" marR="91425" marT="91425" marB="91425">
@@ -17146,21 +17393,77 @@
                     <a:bodyPr/>
                     <a:lstStyle/>
                     <a:p>
-                      <a:pPr marL="0" lvl="0" indent="0" algn="l" rtl="0">
+                      <a:pPr marL="0" marR="0" lvl="0" indent="0" algn="l" defTabSz="914400" rtl="0" eaLnBrk="1" fontAlgn="auto" latinLnBrk="0" hangingPunct="1">
+                        <a:lnSpc>
+                          <a:spcPct val="100000"/>
+                        </a:lnSpc>
                         <a:spcBef>
                           <a:spcPts val="0"/>
                         </a:spcBef>
                         <a:spcAft>
                           <a:spcPts val="0"/>
                         </a:spcAft>
+                        <a:buClr>
+                          <a:srgbClr val="000000"/>
+                        </a:buClr>
+                        <a:buSzTx/>
+                        <a:buFont typeface="Arial"/>
                         <a:buNone/>
+                        <a:tabLst/>
+                        <a:defRPr/>
                       </a:pPr>
-                      <a:endParaRPr>
-                        <a:latin typeface="Open Sans"/>
-                        <a:ea typeface="Open Sans"/>
-                        <a:cs typeface="Open Sans"/>
-                        <a:sym typeface="Open Sans"/>
-                      </a:endParaRPr>
+                      <a:r>
+                        <a:rPr lang="es-AR" sz="1400" b="1" i="0" u="none" strike="noStrike" cap="none" dirty="0" err="1">
+                          <a:solidFill>
+                            <a:srgbClr val="000000"/>
+                          </a:solidFill>
+                          <a:effectLst/>
+                          <a:latin typeface="Arial"/>
+                          <a:ea typeface="Arial"/>
+                          <a:cs typeface="Arial"/>
+                          <a:sym typeface="Arial"/>
+                        </a:rPr>
+                        <a:t>OLOy</a:t>
+                      </a:r>
+                      <a:r>
+                        <a:rPr lang="es-AR" sz="1400" b="1" i="0" u="none" strike="noStrike" cap="none" dirty="0">
+                          <a:solidFill>
+                            <a:srgbClr val="000000"/>
+                          </a:solidFill>
+                          <a:effectLst/>
+                          <a:latin typeface="Arial"/>
+                          <a:ea typeface="Arial"/>
+                          <a:cs typeface="Arial"/>
+                          <a:sym typeface="Arial"/>
+                        </a:rPr>
+                        <a:t> DDR4 64GB (2x32GB) </a:t>
+                      </a:r>
+                      <a:r>
+                        <a:rPr lang="es-AR" sz="1400" b="1" i="0" u="none" strike="noStrike" cap="none" dirty="0" err="1">
+                          <a:solidFill>
+                            <a:srgbClr val="000000"/>
+                          </a:solidFill>
+                          <a:effectLst/>
+                          <a:latin typeface="Arial"/>
+                          <a:ea typeface="Arial"/>
+                          <a:cs typeface="Arial"/>
+                          <a:sym typeface="Arial"/>
+                        </a:rPr>
+                        <a:t>Warhawk</a:t>
+                      </a:r>
+                      <a:r>
+                        <a:rPr lang="es-AR" sz="1400" b="1" i="0" u="none" strike="noStrike" cap="none" dirty="0">
+                          <a:solidFill>
+                            <a:srgbClr val="000000"/>
+                          </a:solidFill>
+                          <a:effectLst/>
+                          <a:latin typeface="Arial"/>
+                          <a:ea typeface="Arial"/>
+                          <a:cs typeface="Arial"/>
+                          <a:sym typeface="Arial"/>
+                        </a:rPr>
+                        <a:t> Black RGB 3600MHz CL18</a:t>
+                      </a:r>
                     </a:p>
                   </a:txBody>
                   <a:tcPr marL="91425" marR="91425" marT="91425" marB="91425">
@@ -17218,21 +17521,64 @@
                     <a:bodyPr/>
                     <a:lstStyle/>
                     <a:p>
-                      <a:pPr marL="0" lvl="0" indent="0" algn="l" rtl="0">
+                      <a:pPr marL="0" marR="0" lvl="0" indent="0" algn="l" defTabSz="914400" rtl="0" eaLnBrk="1" fontAlgn="auto" latinLnBrk="0" hangingPunct="1">
+                        <a:lnSpc>
+                          <a:spcPct val="100000"/>
+                        </a:lnSpc>
                         <a:spcBef>
                           <a:spcPts val="0"/>
                         </a:spcBef>
                         <a:spcAft>
                           <a:spcPts val="0"/>
                         </a:spcAft>
+                        <a:buClr>
+                          <a:srgbClr val="000000"/>
+                        </a:buClr>
+                        <a:buSzTx/>
+                        <a:buFont typeface="Arial"/>
                         <a:buNone/>
+                        <a:tabLst/>
+                        <a:defRPr/>
                       </a:pPr>
-                      <a:endParaRPr>
-                        <a:latin typeface="Open Sans"/>
-                        <a:ea typeface="Open Sans"/>
-                        <a:cs typeface="Open Sans"/>
-                        <a:sym typeface="Open Sans"/>
-                      </a:endParaRPr>
+                      <a:r>
+                        <a:rPr lang="es-AR" sz="1400" b="1" i="0" u="none" strike="noStrike" cap="none" dirty="0">
+                          <a:solidFill>
+                            <a:srgbClr val="000000"/>
+                          </a:solidFill>
+                          <a:effectLst/>
+                          <a:latin typeface="Arial"/>
+                          <a:ea typeface="Arial"/>
+                          <a:cs typeface="Arial"/>
+                          <a:sym typeface="Arial"/>
+                        </a:rPr>
+                        <a:t>SSD M.2 WD 2TB Black SN850 7000MB/s </a:t>
+                      </a:r>
+                      <a:r>
+                        <a:rPr lang="es-AR" sz="1400" b="1" i="0" u="none" strike="noStrike" cap="none" dirty="0" err="1">
+                          <a:solidFill>
+                            <a:srgbClr val="000000"/>
+                          </a:solidFill>
+                          <a:effectLst/>
+                          <a:latin typeface="Arial"/>
+                          <a:ea typeface="Arial"/>
+                          <a:cs typeface="Arial"/>
+                          <a:sym typeface="Arial"/>
+                        </a:rPr>
+                        <a:t>NVMe</a:t>
+                      </a:r>
+                      <a:r>
+                        <a:rPr lang="es-AR" sz="1400" b="1" i="0" u="none" strike="noStrike" cap="none" dirty="0">
+                          <a:solidFill>
+                            <a:srgbClr val="000000"/>
+                          </a:solidFill>
+                          <a:effectLst/>
+                          <a:latin typeface="Arial"/>
+                          <a:ea typeface="Arial"/>
+                          <a:cs typeface="Arial"/>
+                          <a:sym typeface="Arial"/>
+                        </a:rPr>
+                        <a:t> PCIe Gen4</a:t>
+                      </a:r>
                     </a:p>
                   </a:txBody>
                   <a:tcPr marL="91425" marR="91425" marT="91425" marB="91425">
@@ -17290,21 +17636,38 @@
                     <a:bodyPr/>
                     <a:lstStyle/>
                     <a:p>
-                      <a:pPr marL="0" lvl="0" indent="0" algn="l" rtl="0">
+                      <a:pPr marL="0" marR="0" lvl="0" indent="0" algn="l" defTabSz="914400" rtl="0" eaLnBrk="1" fontAlgn="auto" latinLnBrk="0" hangingPunct="1">
+                        <a:lnSpc>
+                          <a:spcPct val="100000"/>
+                        </a:lnSpc>
                         <a:spcBef>
                           <a:spcPts val="0"/>
                         </a:spcBef>
                         <a:spcAft>
                           <a:spcPts val="0"/>
                         </a:spcAft>
+                        <a:buClr>
+                          <a:srgbClr val="000000"/>
+                        </a:buClr>
+                        <a:buSzTx/>
+                        <a:buFont typeface="Arial"/>
                         <a:buNone/>
+                        <a:tabLst/>
+                        <a:defRPr/>
                       </a:pPr>
-                      <a:endParaRPr>
-                        <a:latin typeface="Open Sans"/>
-                        <a:ea typeface="Open Sans"/>
-                        <a:cs typeface="Open Sans"/>
-                        <a:sym typeface="Open Sans"/>
-                      </a:endParaRPr>
+                      <a:r>
+                        <a:rPr lang="es-AR" sz="1400" b="1" i="0" u="none" strike="noStrike" cap="none" dirty="0">
+                          <a:solidFill>
+                            <a:srgbClr val="000000"/>
+                          </a:solidFill>
+                          <a:effectLst/>
+                          <a:latin typeface="Arial"/>
+                          <a:ea typeface="Arial"/>
+                          <a:cs typeface="Arial"/>
+                          <a:sym typeface="Arial"/>
+                        </a:rPr>
+                        <a:t>EVGA GeForce RTX 3090 24GB GDDR6X FTW3 ULTRA ICX3 ARGB</a:t>
+                      </a:r>
                     </a:p>
                   </a:txBody>
                   <a:tcPr marL="91425" marR="91425" marT="91425" marB="91425">

</xml_diff>